<commit_message>
Update Raman data processing.pptx
</commit_message>
<xml_diff>
--- a/Raman data processing.pptx
+++ b/Raman data processing.pptx
@@ -5,14 +5,16 @@
     <p:sldMasterId id="2147483660" r:id="rId1"/>
   </p:sldMasterIdLst>
   <p:notesMasterIdLst>
-    <p:notesMasterId r:id="rId4"/>
+    <p:notesMasterId r:id="rId6"/>
   </p:notesMasterIdLst>
   <p:handoutMasterIdLst>
-    <p:handoutMasterId r:id="rId5"/>
+    <p:handoutMasterId r:id="rId7"/>
   </p:handoutMasterIdLst>
   <p:sldIdLst>
     <p:sldId id="271" r:id="rId2"/>
     <p:sldId id="272" r:id="rId3"/>
+    <p:sldId id="273" r:id="rId4"/>
+    <p:sldId id="274" r:id="rId5"/>
   </p:sldIdLst>
   <p:sldSz cx="9144000" cy="6858000" type="screen4x3"/>
   <p:notesSz cx="6858000" cy="9144000"/>
@@ -226,7 +228,7 @@
           <a:p>
             <a:fld id="{7F7823CC-30B2-4FB3-8699-3C12FD001514}" type="datetimeFigureOut">
               <a:rPr lang="fr-FR" smtClean="0"/>
-              <a:t>27/05/2019</a:t>
+              <a:t>28/05/2019</a:t>
             </a:fld>
             <a:endParaRPr lang="fr-FR"/>
           </a:p>
@@ -391,7 +393,7 @@
           <a:p>
             <a:fld id="{7215295D-F49F-4754-B91E-30BF8F0CADC9}" type="datetimeFigureOut">
               <a:rPr lang="fr-FR" smtClean="0"/>
-              <a:t>27/05/2019</a:t>
+              <a:t>28/05/2019</a:t>
             </a:fld>
             <a:endParaRPr lang="fr-FR"/>
           </a:p>
@@ -44493,7 +44495,7 @@
         <p:spPr>
           <a:xfrm>
             <a:off x="4030452" y="4877113"/>
-            <a:ext cx="435023" cy="717758"/>
+            <a:ext cx="435023" cy="528352"/>
           </a:xfrm>
           <a:prstGeom prst="downArrow">
             <a:avLst/>
@@ -44556,8 +44558,17 @@
           <a:p>
             <a:r>
               <a:rPr lang="fr-FR" b="1" dirty="0" smtClean="0"/>
-              <a:t>Outputs:</a:t>
+              <a:t>Outputs\class </a:t>
             </a:r>
+            <a:r>
+              <a:rPr lang="fr-FR" b="1" dirty="0" err="1" smtClean="0"/>
+              <a:t>attributes</a:t>
+            </a:r>
+            <a:r>
+              <a:rPr lang="fr-FR" b="1" dirty="0" smtClean="0"/>
+              <a:t> :</a:t>
+            </a:r>
+            <a:endParaRPr lang="fr-FR" b="1" dirty="0" smtClean="0"/>
           </a:p>
           <a:p>
             <a:r>
@@ -45115,7 +45126,23 @@
                   <a:schemeClr val="tx2"/>
                 </a:solidFill>
               </a:rPr>
-              <a:t> ni output </a:t>
+              <a:t> </a:t>
+            </a:r>
+            <a:r>
+              <a:rPr lang="fr-FR" dirty="0" smtClean="0">
+                <a:solidFill>
+                  <a:schemeClr val="tx2"/>
+                </a:solidFill>
+              </a:rPr>
+              <a:t>in </a:t>
+            </a:r>
+            <a:r>
+              <a:rPr lang="fr-FR" dirty="0" smtClean="0">
+                <a:solidFill>
+                  <a:schemeClr val="tx2"/>
+                </a:solidFill>
+              </a:rPr>
+              <a:t>output </a:t>
             </a:r>
             <a:r>
               <a:rPr lang="fr-FR" dirty="0" err="1" smtClean="0">
@@ -45126,13 +45153,42 @@
               <a:t>folder</a:t>
             </a:r>
             <a:r>
-              <a:rPr lang="fr-FR" dirty="0" smtClean="0">
+              <a:rPr lang="fr-FR" dirty="0">
                 <a:solidFill>
                   <a:schemeClr val="tx2"/>
                 </a:solidFill>
               </a:rPr>
               <a:t> </a:t>
             </a:r>
+            <a:r>
+              <a:rPr lang="fr-FR" dirty="0" smtClean="0">
+                <a:solidFill>
+                  <a:schemeClr val="tx2"/>
+                </a:solidFill>
+              </a:rPr>
+              <a:t>(</a:t>
+            </a:r>
+            <a:r>
+              <a:rPr lang="fr-FR" dirty="0" err="1" smtClean="0">
+                <a:solidFill>
+                  <a:schemeClr val="tx2"/>
+                </a:solidFill>
+              </a:rPr>
+              <a:t>optional</a:t>
+            </a:r>
+            <a:r>
+              <a:rPr lang="fr-FR" dirty="0" smtClean="0">
+                <a:solidFill>
+                  <a:schemeClr val="tx2"/>
+                </a:solidFill>
+              </a:rPr>
+              <a:t>)</a:t>
+            </a:r>
+            <a:endParaRPr lang="fr-FR" dirty="0" smtClean="0">
+              <a:solidFill>
+                <a:schemeClr val="tx2"/>
+              </a:solidFill>
+            </a:endParaRPr>
           </a:p>
           <a:p>
             <a:pPr lvl="1"/>
@@ -45288,6 +45344,62 @@
           </a:p>
           <a:p>
             <a:pPr lvl="1"/>
+            <a:r>
+              <a:rPr lang="fr-FR" dirty="0" smtClean="0">
+                <a:solidFill>
+                  <a:schemeClr val="tx2"/>
+                </a:solidFill>
+              </a:rPr>
+              <a:t>Time : </a:t>
+            </a:r>
+            <a:r>
+              <a:rPr lang="fr-FR" dirty="0" err="1" smtClean="0">
+                <a:solidFill>
+                  <a:schemeClr val="tx2"/>
+                </a:solidFill>
+              </a:rPr>
+              <a:t>extract</a:t>
+            </a:r>
+            <a:r>
+              <a:rPr lang="fr-FR" dirty="0" smtClean="0">
+                <a:solidFill>
+                  <a:schemeClr val="tx2"/>
+                </a:solidFill>
+              </a:rPr>
+              <a:t> time and store </a:t>
+            </a:r>
+            <a:r>
+              <a:rPr lang="fr-FR" dirty="0" err="1" smtClean="0">
+                <a:solidFill>
+                  <a:schemeClr val="tx2"/>
+                </a:solidFill>
+              </a:rPr>
+              <a:t>it</a:t>
+            </a:r>
+            <a:r>
+              <a:rPr lang="fr-FR" dirty="0" smtClean="0">
+                <a:solidFill>
+                  <a:schemeClr val="tx2"/>
+                </a:solidFill>
+              </a:rPr>
+              <a:t> as an </a:t>
+            </a:r>
+            <a:r>
+              <a:rPr lang="fr-FR" dirty="0" err="1" smtClean="0">
+                <a:solidFill>
+                  <a:schemeClr val="tx2"/>
+                </a:solidFill>
+              </a:rPr>
+              <a:t>attribute</a:t>
+            </a:r>
+            <a:endParaRPr lang="fr-FR" dirty="0" smtClean="0">
+              <a:solidFill>
+                <a:schemeClr val="tx2"/>
+              </a:solidFill>
+            </a:endParaRPr>
+          </a:p>
+          <a:p>
+            <a:pPr lvl="1"/>
             <a:endParaRPr lang="fr-FR" dirty="0" smtClean="0">
               <a:solidFill>
                 <a:schemeClr val="tx2"/>
@@ -45377,6 +45489,1475 @@
     <p:extLst>
       <p:ext uri="{BB962C8B-B14F-4D97-AF65-F5344CB8AC3E}">
         <p14:creationId xmlns:p14="http://schemas.microsoft.com/office/powerpoint/2010/main" val="3234418903"/>
+      </p:ext>
+    </p:extLst>
+  </p:cSld>
+  <p:clrMapOvr>
+    <a:masterClrMapping/>
+  </p:clrMapOvr>
+</p:sld>
+</file>
+
+<file path=ppt/slides/slide3.xml><?xml version="1.0" encoding="utf-8"?>
+<p:sld xmlns:a="http://schemas.openxmlformats.org/drawingml/2006/main" xmlns:r="http://schemas.openxmlformats.org/officeDocument/2006/relationships" xmlns:p="http://schemas.openxmlformats.org/presentationml/2006/main">
+  <p:cSld>
+    <p:spTree>
+      <p:nvGrpSpPr>
+        <p:cNvPr id="1" name=""/>
+        <p:cNvGrpSpPr/>
+        <p:nvPr/>
+      </p:nvGrpSpPr>
+      <p:grpSpPr>
+        <a:xfrm>
+          <a:off x="0" y="0"/>
+          <a:ext cx="0" cy="0"/>
+          <a:chOff x="0" y="0"/>
+          <a:chExt cx="0" cy="0"/>
+        </a:xfrm>
+      </p:grpSpPr>
+      <p:sp>
+        <p:nvSpPr>
+          <p:cNvPr id="2" name="Espace réservé du pied de page 1"/>
+          <p:cNvSpPr>
+            <a:spLocks noGrp="1"/>
+          </p:cNvSpPr>
+          <p:nvPr>
+            <p:ph type="ftr" sz="quarter" idx="3"/>
+          </p:nvPr>
+        </p:nvSpPr>
+        <p:spPr/>
+        <p:txBody>
+          <a:bodyPr/>
+          <a:lstStyle/>
+          <a:p>
+            <a:r>
+              <a:rPr lang="fr-FR" smtClean="0"/>
+              <a:t>CR | Michaud Laurent | Date</a:t>
+            </a:r>
+            <a:endParaRPr lang="fr-FR" dirty="0"/>
+          </a:p>
+        </p:txBody>
+      </p:sp>
+      <p:sp>
+        <p:nvSpPr>
+          <p:cNvPr id="3" name="Espace réservé du contenu 2"/>
+          <p:cNvSpPr>
+            <a:spLocks noGrp="1"/>
+          </p:cNvSpPr>
+          <p:nvPr>
+            <p:ph sz="quarter" idx="18"/>
+          </p:nvPr>
+        </p:nvSpPr>
+        <p:spPr>
+          <a:xfrm>
+            <a:off x="359251" y="1257300"/>
+            <a:ext cx="5940941" cy="5052020"/>
+          </a:xfrm>
+        </p:spPr>
+        <p:txBody>
+          <a:bodyPr/>
+          <a:lstStyle/>
+          <a:p>
+            <a:pPr marL="0" indent="0" algn="just">
+              <a:buNone/>
+            </a:pPr>
+            <a:r>
+              <a:rPr lang="fr-FR" dirty="0" smtClean="0"/>
+              <a:t>Packages imports</a:t>
+            </a:r>
+          </a:p>
+          <a:p>
+            <a:pPr algn="just"/>
+            <a:r>
+              <a:rPr lang="fr-FR" dirty="0" err="1" smtClean="0"/>
+              <a:t>Raman_spectrum</a:t>
+            </a:r>
+            <a:r>
+              <a:rPr lang="fr-FR" dirty="0" smtClean="0"/>
+              <a:t> class </a:t>
+            </a:r>
+            <a:r>
+              <a:rPr lang="fr-FR" dirty="0" err="1" smtClean="0"/>
+              <a:t>definition</a:t>
+            </a:r>
+            <a:r>
+              <a:rPr lang="fr-FR" dirty="0" smtClean="0"/>
+              <a:t> (</a:t>
+            </a:r>
+            <a:r>
+              <a:rPr lang="fr-FR" dirty="0" err="1" smtClean="0"/>
+              <a:t>args</a:t>
+            </a:r>
+            <a:r>
+              <a:rPr lang="fr-FR" dirty="0"/>
+              <a:t> </a:t>
+            </a:r>
+            <a:r>
+              <a:rPr lang="fr-FR" dirty="0" smtClean="0"/>
+              <a:t>: </a:t>
+            </a:r>
+            <a:r>
+              <a:rPr lang="fr-FR" dirty="0" err="1" smtClean="0"/>
+              <a:t>filename,wn_min</a:t>
+            </a:r>
+            <a:r>
+              <a:rPr lang="fr-FR" dirty="0" smtClean="0"/>
+              <a:t>=480, </a:t>
+            </a:r>
+            <a:r>
+              <a:rPr lang="fr-FR" dirty="0" err="1" smtClean="0"/>
+              <a:t>wn_max</a:t>
+            </a:r>
+            <a:r>
+              <a:rPr lang="fr-FR" dirty="0" smtClean="0"/>
+              <a:t>=560</a:t>
+            </a:r>
+            <a:r>
+              <a:rPr lang="fr-FR" dirty="0"/>
+              <a:t>)</a:t>
+            </a:r>
+            <a:endParaRPr lang="fr-FR" dirty="0" smtClean="0"/>
+          </a:p>
+          <a:p>
+            <a:pPr lvl="1" algn="just"/>
+            <a:r>
+              <a:rPr lang="fr-FR" dirty="0" err="1" smtClean="0">
+                <a:solidFill>
+                  <a:srgbClr val="00B050"/>
+                </a:solidFill>
+              </a:rPr>
+              <a:t>Init</a:t>
+            </a:r>
+            <a:r>
+              <a:rPr lang="fr-FR" dirty="0" smtClean="0">
+                <a:solidFill>
+                  <a:srgbClr val="00B050"/>
+                </a:solidFill>
+              </a:rPr>
+              <a:t> </a:t>
+            </a:r>
+            <a:r>
+              <a:rPr lang="fr-FR" dirty="0" err="1" smtClean="0">
+                <a:solidFill>
+                  <a:srgbClr val="00B050"/>
+                </a:solidFill>
+              </a:rPr>
+              <a:t>function</a:t>
+            </a:r>
+            <a:r>
+              <a:rPr lang="fr-FR" dirty="0" smtClean="0">
+                <a:solidFill>
+                  <a:srgbClr val="00B050"/>
+                </a:solidFill>
+              </a:rPr>
+              <a:t> : </a:t>
+            </a:r>
+            <a:r>
+              <a:rPr lang="fr-FR" dirty="0" err="1" smtClean="0">
+                <a:solidFill>
+                  <a:srgbClr val="00B050"/>
+                </a:solidFill>
+              </a:rPr>
+              <a:t>extract</a:t>
+            </a:r>
+            <a:r>
+              <a:rPr lang="fr-FR" dirty="0" smtClean="0">
+                <a:solidFill>
+                  <a:srgbClr val="00B050"/>
+                </a:solidFill>
+              </a:rPr>
+              <a:t> </a:t>
+            </a:r>
+            <a:r>
+              <a:rPr lang="fr-FR" dirty="0" err="1" smtClean="0">
+                <a:solidFill>
+                  <a:srgbClr val="00B050"/>
+                </a:solidFill>
+              </a:rPr>
+              <a:t>raw</a:t>
+            </a:r>
+            <a:r>
+              <a:rPr lang="fr-FR" dirty="0" smtClean="0">
+                <a:solidFill>
+                  <a:srgbClr val="00B050"/>
+                </a:solidFill>
+              </a:rPr>
+              <a:t> data </a:t>
+            </a:r>
+            <a:r>
+              <a:rPr lang="fr-FR" dirty="0" err="1" smtClean="0">
+                <a:solidFill>
+                  <a:srgbClr val="00B050"/>
+                </a:solidFill>
+              </a:rPr>
+              <a:t>from</a:t>
+            </a:r>
+            <a:r>
+              <a:rPr lang="fr-FR" dirty="0" smtClean="0">
+                <a:solidFill>
+                  <a:srgbClr val="00B050"/>
+                </a:solidFill>
+              </a:rPr>
+              <a:t>  .</a:t>
+            </a:r>
+            <a:r>
+              <a:rPr lang="fr-FR" dirty="0" err="1" smtClean="0">
+                <a:solidFill>
+                  <a:srgbClr val="00B050"/>
+                </a:solidFill>
+              </a:rPr>
+              <a:t>txt</a:t>
+            </a:r>
+            <a:r>
+              <a:rPr lang="fr-FR" dirty="0" smtClean="0">
+                <a:solidFill>
+                  <a:srgbClr val="00B050"/>
+                </a:solidFill>
+              </a:rPr>
+              <a:t> file</a:t>
+            </a:r>
+          </a:p>
+          <a:p>
+            <a:pPr lvl="1" algn="just"/>
+            <a:r>
+              <a:rPr lang="fr-FR" dirty="0" err="1" smtClean="0">
+                <a:solidFill>
+                  <a:srgbClr val="FFC000"/>
+                </a:solidFill>
+              </a:rPr>
+              <a:t>Lorentzian</a:t>
+            </a:r>
+            <a:r>
+              <a:rPr lang="fr-FR" dirty="0" smtClean="0">
+                <a:solidFill>
+                  <a:srgbClr val="FFC000"/>
+                </a:solidFill>
+              </a:rPr>
+              <a:t> : </a:t>
+            </a:r>
+            <a:r>
+              <a:rPr lang="fr-FR" dirty="0" err="1" smtClean="0">
+                <a:solidFill>
+                  <a:srgbClr val="FFC000"/>
+                </a:solidFill>
+              </a:rPr>
+              <a:t>define</a:t>
+            </a:r>
+            <a:r>
+              <a:rPr lang="fr-FR" dirty="0" smtClean="0">
+                <a:solidFill>
+                  <a:srgbClr val="FFC000"/>
+                </a:solidFill>
+              </a:rPr>
+              <a:t> </a:t>
+            </a:r>
+            <a:r>
+              <a:rPr lang="fr-FR" dirty="0" err="1" smtClean="0">
+                <a:solidFill>
+                  <a:srgbClr val="FFC000"/>
+                </a:solidFill>
+              </a:rPr>
+              <a:t>lorentzian</a:t>
+            </a:r>
+            <a:r>
+              <a:rPr lang="fr-FR" dirty="0" smtClean="0">
+                <a:solidFill>
+                  <a:srgbClr val="FFC000"/>
+                </a:solidFill>
+              </a:rPr>
+              <a:t> </a:t>
+            </a:r>
+            <a:r>
+              <a:rPr lang="fr-FR" dirty="0" err="1" smtClean="0">
+                <a:solidFill>
+                  <a:srgbClr val="FFC000"/>
+                </a:solidFill>
+              </a:rPr>
+              <a:t>function</a:t>
+            </a:r>
+            <a:r>
+              <a:rPr lang="fr-FR" dirty="0" smtClean="0">
+                <a:solidFill>
+                  <a:srgbClr val="FFC000"/>
+                </a:solidFill>
+              </a:rPr>
+              <a:t> for the fit</a:t>
+            </a:r>
+          </a:p>
+          <a:p>
+            <a:pPr lvl="1" algn="just"/>
+            <a:r>
+              <a:rPr lang="fr-FR" dirty="0" smtClean="0">
+                <a:solidFill>
+                  <a:srgbClr val="FFC000"/>
+                </a:solidFill>
+              </a:rPr>
+              <a:t>Fit : fit value </a:t>
+            </a:r>
+            <a:r>
+              <a:rPr lang="fr-FR" dirty="0" err="1" smtClean="0">
+                <a:solidFill>
+                  <a:srgbClr val="FFC000"/>
+                </a:solidFill>
+              </a:rPr>
+              <a:t>between</a:t>
+            </a:r>
+            <a:r>
+              <a:rPr lang="fr-FR" dirty="0" smtClean="0">
+                <a:solidFill>
+                  <a:srgbClr val="FFC000"/>
+                </a:solidFill>
+              </a:rPr>
+              <a:t> </a:t>
+            </a:r>
+            <a:r>
+              <a:rPr lang="fr-FR" dirty="0" err="1" smtClean="0">
+                <a:solidFill>
+                  <a:srgbClr val="FFC000"/>
+                </a:solidFill>
+              </a:rPr>
+              <a:t>wn_min</a:t>
+            </a:r>
+            <a:r>
+              <a:rPr lang="fr-FR" dirty="0" smtClean="0">
+                <a:solidFill>
+                  <a:srgbClr val="FFC000"/>
+                </a:solidFill>
+              </a:rPr>
+              <a:t> and </a:t>
+            </a:r>
+            <a:r>
+              <a:rPr lang="fr-FR" dirty="0" err="1" smtClean="0">
+                <a:solidFill>
+                  <a:srgbClr val="FFC000"/>
+                </a:solidFill>
+              </a:rPr>
+              <a:t>wn_max</a:t>
+            </a:r>
+            <a:r>
+              <a:rPr lang="fr-FR" dirty="0" smtClean="0">
+                <a:solidFill>
+                  <a:srgbClr val="FFC000"/>
+                </a:solidFill>
+              </a:rPr>
+              <a:t> </a:t>
+            </a:r>
+            <a:r>
+              <a:rPr lang="fr-FR" dirty="0" err="1" smtClean="0">
+                <a:solidFill>
+                  <a:srgbClr val="FFC000"/>
+                </a:solidFill>
+              </a:rPr>
+              <a:t>with</a:t>
+            </a:r>
+            <a:r>
+              <a:rPr lang="fr-FR" dirty="0" smtClean="0">
+                <a:solidFill>
+                  <a:srgbClr val="FFC000"/>
+                </a:solidFill>
+              </a:rPr>
+              <a:t> a </a:t>
+            </a:r>
+            <a:r>
+              <a:rPr lang="fr-FR" dirty="0" err="1" smtClean="0">
+                <a:solidFill>
+                  <a:srgbClr val="FFC000"/>
+                </a:solidFill>
+              </a:rPr>
+              <a:t>relentzian</a:t>
+            </a:r>
+            <a:r>
+              <a:rPr lang="fr-FR" dirty="0" smtClean="0">
+                <a:solidFill>
+                  <a:srgbClr val="FFC000"/>
+                </a:solidFill>
+              </a:rPr>
+              <a:t> </a:t>
+            </a:r>
+            <a:r>
+              <a:rPr lang="fr-FR" dirty="0" err="1" smtClean="0">
+                <a:solidFill>
+                  <a:srgbClr val="FFC000"/>
+                </a:solidFill>
+              </a:rPr>
+              <a:t>function</a:t>
+            </a:r>
+            <a:r>
+              <a:rPr lang="fr-FR" dirty="0" smtClean="0">
+                <a:solidFill>
+                  <a:srgbClr val="FFC000"/>
+                </a:solidFill>
+              </a:rPr>
+              <a:t>, return </a:t>
+            </a:r>
+            <a:r>
+              <a:rPr lang="fr-FR" dirty="0" err="1" smtClean="0">
+                <a:solidFill>
+                  <a:srgbClr val="FFC000"/>
+                </a:solidFill>
+              </a:rPr>
+              <a:t>parameter</a:t>
+            </a:r>
+            <a:r>
+              <a:rPr lang="fr-FR" dirty="0" smtClean="0">
+                <a:solidFill>
+                  <a:srgbClr val="FFC000"/>
+                </a:solidFill>
+              </a:rPr>
+              <a:t> and </a:t>
+            </a:r>
+            <a:r>
+              <a:rPr lang="fr-FR" dirty="0" err="1" smtClean="0">
+                <a:solidFill>
+                  <a:srgbClr val="FFC000"/>
+                </a:solidFill>
+              </a:rPr>
+              <a:t>residue</a:t>
+            </a:r>
+            <a:endParaRPr lang="fr-FR" dirty="0" smtClean="0">
+              <a:solidFill>
+                <a:srgbClr val="FFC000"/>
+              </a:solidFill>
+            </a:endParaRPr>
+          </a:p>
+          <a:p>
+            <a:pPr lvl="1" algn="just"/>
+            <a:r>
+              <a:rPr lang="fr-FR" dirty="0" smtClean="0">
+                <a:solidFill>
+                  <a:schemeClr val="tx2"/>
+                </a:solidFill>
+              </a:rPr>
+              <a:t>Plot </a:t>
+            </a:r>
+            <a:r>
+              <a:rPr lang="fr-FR" dirty="0" err="1" smtClean="0">
+                <a:solidFill>
+                  <a:schemeClr val="tx2"/>
+                </a:solidFill>
+              </a:rPr>
+              <a:t>mehod</a:t>
+            </a:r>
+            <a:r>
+              <a:rPr lang="fr-FR" dirty="0" smtClean="0">
+                <a:solidFill>
+                  <a:schemeClr val="tx2"/>
+                </a:solidFill>
+              </a:rPr>
+              <a:t> (</a:t>
+            </a:r>
+            <a:r>
+              <a:rPr lang="fr-FR" dirty="0" err="1" smtClean="0">
+                <a:solidFill>
+                  <a:schemeClr val="tx2"/>
+                </a:solidFill>
+              </a:rPr>
+              <a:t>optional</a:t>
+            </a:r>
+            <a:r>
+              <a:rPr lang="fr-FR" dirty="0" smtClean="0">
+                <a:solidFill>
+                  <a:schemeClr val="tx2"/>
+                </a:solidFill>
+              </a:rPr>
+              <a:t>) : </a:t>
+            </a:r>
+            <a:r>
+              <a:rPr lang="fr-FR" dirty="0" smtClean="0">
+                <a:solidFill>
+                  <a:schemeClr val="tx2"/>
+                </a:solidFill>
+              </a:rPr>
+              <a:t>plot </a:t>
+            </a:r>
+            <a:r>
+              <a:rPr lang="fr-FR" dirty="0" err="1" smtClean="0">
+                <a:solidFill>
+                  <a:schemeClr val="tx2"/>
+                </a:solidFill>
+              </a:rPr>
+              <a:t>experimental</a:t>
+            </a:r>
+            <a:r>
+              <a:rPr lang="fr-FR" dirty="0" smtClean="0">
+                <a:solidFill>
+                  <a:schemeClr val="tx2"/>
+                </a:solidFill>
+              </a:rPr>
+              <a:t> data and fit on a </a:t>
+            </a:r>
+            <a:r>
+              <a:rPr lang="fr-FR" dirty="0" err="1" smtClean="0">
+                <a:solidFill>
+                  <a:schemeClr val="tx2"/>
+                </a:solidFill>
+              </a:rPr>
+              <a:t>same</a:t>
+            </a:r>
+            <a:r>
+              <a:rPr lang="fr-FR" dirty="0" smtClean="0">
+                <a:solidFill>
+                  <a:schemeClr val="tx2"/>
+                </a:solidFill>
+              </a:rPr>
+              <a:t> graph + </a:t>
+            </a:r>
+            <a:r>
+              <a:rPr lang="fr-FR" dirty="0" err="1" smtClean="0">
+                <a:solidFill>
+                  <a:schemeClr val="tx2"/>
+                </a:solidFill>
+              </a:rPr>
+              <a:t>save</a:t>
+            </a:r>
+            <a:r>
+              <a:rPr lang="fr-FR" dirty="0" smtClean="0">
+                <a:solidFill>
+                  <a:schemeClr val="tx2"/>
+                </a:solidFill>
+              </a:rPr>
+              <a:t> ni output </a:t>
+            </a:r>
+            <a:r>
+              <a:rPr lang="fr-FR" dirty="0" err="1" smtClean="0">
+                <a:solidFill>
+                  <a:schemeClr val="tx2"/>
+                </a:solidFill>
+              </a:rPr>
+              <a:t>folder</a:t>
+            </a:r>
+            <a:r>
+              <a:rPr lang="fr-FR" dirty="0" smtClean="0">
+                <a:solidFill>
+                  <a:schemeClr val="tx2"/>
+                </a:solidFill>
+              </a:rPr>
+              <a:t> </a:t>
+            </a:r>
+          </a:p>
+          <a:p>
+            <a:pPr lvl="1" algn="just"/>
+            <a:r>
+              <a:rPr lang="fr-FR" dirty="0" smtClean="0">
+                <a:solidFill>
+                  <a:schemeClr val="tx2"/>
+                </a:solidFill>
+              </a:rPr>
+              <a:t>Force user input for force at </a:t>
+            </a:r>
+            <a:r>
+              <a:rPr lang="fr-FR" dirty="0" err="1" smtClean="0">
+                <a:solidFill>
+                  <a:schemeClr val="tx2"/>
+                </a:solidFill>
+              </a:rPr>
+              <a:t>which</a:t>
+            </a:r>
+            <a:r>
+              <a:rPr lang="fr-FR" dirty="0" smtClean="0">
+                <a:solidFill>
+                  <a:schemeClr val="tx2"/>
+                </a:solidFill>
+              </a:rPr>
+              <a:t> the </a:t>
+            </a:r>
+            <a:r>
+              <a:rPr lang="fr-FR" dirty="0" err="1" smtClean="0">
+                <a:solidFill>
+                  <a:schemeClr val="tx2"/>
+                </a:solidFill>
+              </a:rPr>
+              <a:t>specturm</a:t>
+            </a:r>
+            <a:r>
+              <a:rPr lang="fr-FR" dirty="0" smtClean="0">
+                <a:solidFill>
+                  <a:schemeClr val="tx2"/>
+                </a:solidFill>
+              </a:rPr>
+              <a:t> </a:t>
+            </a:r>
+            <a:r>
+              <a:rPr lang="fr-FR" dirty="0" err="1" smtClean="0">
+                <a:solidFill>
+                  <a:schemeClr val="tx2"/>
+                </a:solidFill>
+              </a:rPr>
+              <a:t>was</a:t>
+            </a:r>
+            <a:r>
+              <a:rPr lang="fr-FR" dirty="0" smtClean="0">
+                <a:solidFill>
+                  <a:schemeClr val="tx2"/>
+                </a:solidFill>
+              </a:rPr>
+              <a:t> </a:t>
+            </a:r>
+            <a:r>
+              <a:rPr lang="fr-FR" dirty="0" err="1" smtClean="0">
+                <a:solidFill>
+                  <a:schemeClr val="tx2"/>
+                </a:solidFill>
+              </a:rPr>
+              <a:t>measured</a:t>
+            </a:r>
+            <a:endParaRPr lang="fr-FR" dirty="0" smtClean="0">
+              <a:solidFill>
+                <a:schemeClr val="tx2"/>
+              </a:solidFill>
+            </a:endParaRPr>
+          </a:p>
+          <a:p>
+            <a:pPr lvl="1" algn="just"/>
+            <a:r>
+              <a:rPr lang="fr-FR" dirty="0" err="1" smtClean="0">
+                <a:solidFill>
+                  <a:schemeClr val="tx2"/>
+                </a:solidFill>
+              </a:rPr>
+              <a:t>Displacement</a:t>
+            </a:r>
+            <a:r>
+              <a:rPr lang="fr-FR" dirty="0" smtClean="0">
+                <a:solidFill>
+                  <a:schemeClr val="tx2"/>
+                </a:solidFill>
+              </a:rPr>
+              <a:t> </a:t>
+            </a:r>
+            <a:r>
+              <a:rPr lang="fr-FR" dirty="0" smtClean="0">
+                <a:solidFill>
+                  <a:schemeClr val="tx2"/>
+                </a:solidFill>
+              </a:rPr>
+              <a:t>: user input at </a:t>
+            </a:r>
+            <a:r>
+              <a:rPr lang="fr-FR" dirty="0" err="1" smtClean="0">
+                <a:solidFill>
+                  <a:schemeClr val="tx2"/>
+                </a:solidFill>
+              </a:rPr>
+              <a:t>which</a:t>
+            </a:r>
+            <a:r>
+              <a:rPr lang="fr-FR" dirty="0" smtClean="0">
+                <a:solidFill>
+                  <a:schemeClr val="tx2"/>
+                </a:solidFill>
+              </a:rPr>
+              <a:t> the </a:t>
+            </a:r>
+            <a:r>
+              <a:rPr lang="fr-FR" dirty="0" err="1" smtClean="0">
+                <a:solidFill>
+                  <a:schemeClr val="tx2"/>
+                </a:solidFill>
+              </a:rPr>
+              <a:t>spectrum</a:t>
+            </a:r>
+            <a:r>
+              <a:rPr lang="fr-FR" dirty="0" smtClean="0">
+                <a:solidFill>
+                  <a:schemeClr val="tx2"/>
+                </a:solidFill>
+              </a:rPr>
+              <a:t> </a:t>
+            </a:r>
+            <a:r>
+              <a:rPr lang="fr-FR" dirty="0" err="1" smtClean="0">
+                <a:solidFill>
+                  <a:schemeClr val="tx2"/>
+                </a:solidFill>
+              </a:rPr>
+              <a:t>was</a:t>
+            </a:r>
+            <a:r>
+              <a:rPr lang="fr-FR" dirty="0" smtClean="0">
+                <a:solidFill>
+                  <a:schemeClr val="tx2"/>
+                </a:solidFill>
+              </a:rPr>
+              <a:t> </a:t>
+            </a:r>
+            <a:r>
+              <a:rPr lang="fr-FR" dirty="0" err="1" smtClean="0">
+                <a:solidFill>
+                  <a:schemeClr val="tx2"/>
+                </a:solidFill>
+              </a:rPr>
+              <a:t>measured</a:t>
+            </a:r>
+            <a:endParaRPr lang="fr-FR" dirty="0" smtClean="0">
+              <a:solidFill>
+                <a:schemeClr val="tx2"/>
+              </a:solidFill>
+            </a:endParaRPr>
+          </a:p>
+          <a:p>
+            <a:pPr lvl="1" algn="just"/>
+            <a:r>
+              <a:rPr lang="fr-FR" dirty="0" smtClean="0">
+                <a:solidFill>
+                  <a:schemeClr val="tx2"/>
+                </a:solidFill>
+              </a:rPr>
+              <a:t>Time : </a:t>
+            </a:r>
+            <a:r>
+              <a:rPr lang="fr-FR" dirty="0" err="1" smtClean="0">
+                <a:solidFill>
+                  <a:schemeClr val="tx2"/>
+                </a:solidFill>
+              </a:rPr>
+              <a:t>extract</a:t>
+            </a:r>
+            <a:r>
+              <a:rPr lang="fr-FR" dirty="0" smtClean="0">
+                <a:solidFill>
+                  <a:schemeClr val="tx2"/>
+                </a:solidFill>
+              </a:rPr>
+              <a:t> time and store </a:t>
+            </a:r>
+            <a:r>
+              <a:rPr lang="fr-FR" dirty="0" err="1" smtClean="0">
+                <a:solidFill>
+                  <a:schemeClr val="tx2"/>
+                </a:solidFill>
+              </a:rPr>
+              <a:t>it</a:t>
+            </a:r>
+            <a:r>
+              <a:rPr lang="fr-FR" dirty="0" smtClean="0">
+                <a:solidFill>
+                  <a:schemeClr val="tx2"/>
+                </a:solidFill>
+              </a:rPr>
+              <a:t> as an </a:t>
+            </a:r>
+            <a:r>
+              <a:rPr lang="fr-FR" dirty="0" err="1" smtClean="0">
+                <a:solidFill>
+                  <a:schemeClr val="tx2"/>
+                </a:solidFill>
+              </a:rPr>
+              <a:t>attribute</a:t>
+            </a:r>
+            <a:endParaRPr lang="fr-FR" dirty="0" smtClean="0">
+              <a:solidFill>
+                <a:schemeClr val="tx2"/>
+              </a:solidFill>
+            </a:endParaRPr>
+          </a:p>
+          <a:p>
+            <a:pPr lvl="1" algn="just"/>
+            <a:endParaRPr lang="fr-FR" dirty="0" smtClean="0">
+              <a:solidFill>
+                <a:schemeClr val="tx2"/>
+              </a:solidFill>
+            </a:endParaRPr>
+          </a:p>
+          <a:p>
+            <a:pPr lvl="1" algn="just"/>
+            <a:endParaRPr lang="fr-FR" dirty="0"/>
+          </a:p>
+        </p:txBody>
+      </p:sp>
+      <p:sp>
+        <p:nvSpPr>
+          <p:cNvPr id="4" name="Titre 3"/>
+          <p:cNvSpPr>
+            <a:spLocks noGrp="1"/>
+          </p:cNvSpPr>
+          <p:nvPr>
+            <p:ph type="title"/>
+          </p:nvPr>
+        </p:nvSpPr>
+        <p:spPr/>
+        <p:txBody>
+          <a:bodyPr/>
+          <a:lstStyle/>
+          <a:p>
+            <a:r>
+              <a:rPr lang="fr-FR" dirty="0" smtClean="0"/>
+              <a:t>Python </a:t>
+            </a:r>
+            <a:r>
+              <a:rPr lang="fr-FR" dirty="0" err="1" smtClean="0"/>
+              <a:t>parser</a:t>
+            </a:r>
+            <a:r>
+              <a:rPr lang="fr-FR" dirty="0" smtClean="0"/>
+              <a:t> and </a:t>
+            </a:r>
+            <a:r>
+              <a:rPr lang="fr-FR" dirty="0" err="1" smtClean="0"/>
+              <a:t>fitting</a:t>
+            </a:r>
+            <a:r>
+              <a:rPr lang="fr-FR" dirty="0" smtClean="0"/>
+              <a:t> script</a:t>
+            </a:r>
+            <a:endParaRPr lang="fr-FR" dirty="0"/>
+          </a:p>
+        </p:txBody>
+      </p:sp>
+      <p:sp>
+        <p:nvSpPr>
+          <p:cNvPr id="5" name="ZoneTexte 4"/>
+          <p:cNvSpPr txBox="1"/>
+          <p:nvPr/>
+        </p:nvSpPr>
+        <p:spPr>
+          <a:xfrm>
+            <a:off x="6516216" y="364606"/>
+            <a:ext cx="4824536" cy="461665"/>
+          </a:xfrm>
+          <a:prstGeom prst="rect">
+            <a:avLst/>
+          </a:prstGeom>
+          <a:noFill/>
+        </p:spPr>
+        <p:txBody>
+          <a:bodyPr wrap="square" rtlCol="0">
+            <a:spAutoFit/>
+          </a:bodyPr>
+          <a:lstStyle/>
+          <a:p>
+            <a:r>
+              <a:rPr lang="fr-FR" sz="2400" dirty="0" err="1" smtClean="0"/>
+              <a:t>x</a:t>
+            </a:r>
+            <a:r>
+              <a:rPr lang="fr-FR" sz="2400" dirty="0" err="1" smtClean="0"/>
+              <a:t>y_maps</a:t>
+            </a:r>
+            <a:endParaRPr lang="fr-FR" sz="2400" dirty="0"/>
+          </a:p>
+        </p:txBody>
+      </p:sp>
+      <p:sp>
+        <p:nvSpPr>
+          <p:cNvPr id="6" name="ZoneTexte 5"/>
+          <p:cNvSpPr txBox="1"/>
+          <p:nvPr/>
+        </p:nvSpPr>
+        <p:spPr>
+          <a:xfrm>
+            <a:off x="6444208" y="1196752"/>
+            <a:ext cx="2699792" cy="2308324"/>
+          </a:xfrm>
+          <a:prstGeom prst="rect">
+            <a:avLst/>
+          </a:prstGeom>
+          <a:noFill/>
+        </p:spPr>
+        <p:txBody>
+          <a:bodyPr wrap="square" rtlCol="0">
+            <a:spAutoFit/>
+          </a:bodyPr>
+          <a:lstStyle/>
+          <a:p>
+            <a:r>
+              <a:rPr lang="fr-FR" dirty="0" smtClean="0"/>
+              <a:t>File format :</a:t>
+            </a:r>
+          </a:p>
+          <a:p>
+            <a:pPr marL="285750" indent="-285750">
+              <a:buFont typeface="Arial" panose="020B0604020202020204" pitchFamily="34" charset="0"/>
+              <a:buChar char="•"/>
+            </a:pPr>
+            <a:r>
+              <a:rPr lang="fr-FR" dirty="0" smtClean="0"/>
+              <a:t>34 </a:t>
+            </a:r>
+            <a:r>
+              <a:rPr lang="fr-FR" dirty="0" err="1" smtClean="0"/>
+              <a:t>lines</a:t>
+            </a:r>
+            <a:r>
+              <a:rPr lang="fr-FR" dirty="0" smtClean="0"/>
+              <a:t> header</a:t>
+            </a:r>
+          </a:p>
+          <a:p>
+            <a:pPr marL="285750" indent="-285750">
+              <a:buFont typeface="Arial" panose="020B0604020202020204" pitchFamily="34" charset="0"/>
+              <a:buChar char="•"/>
+            </a:pPr>
+            <a:r>
+              <a:rPr lang="fr-FR" dirty="0" smtClean="0"/>
+              <a:t>35th line : </a:t>
+            </a:r>
+            <a:r>
+              <a:rPr lang="fr-FR" dirty="0" err="1" smtClean="0"/>
+              <a:t>wave</a:t>
+            </a:r>
+            <a:r>
+              <a:rPr lang="fr-FR" dirty="0" smtClean="0"/>
+              <a:t> </a:t>
+            </a:r>
+            <a:r>
+              <a:rPr lang="fr-FR" dirty="0" err="1" smtClean="0"/>
+              <a:t>number</a:t>
+            </a:r>
+            <a:endParaRPr lang="fr-FR" dirty="0" smtClean="0"/>
+          </a:p>
+          <a:p>
+            <a:pPr marL="285750" indent="-285750">
+              <a:buFont typeface="Arial" panose="020B0604020202020204" pitchFamily="34" charset="0"/>
+              <a:buChar char="•"/>
+            </a:pPr>
+            <a:r>
+              <a:rPr lang="fr-FR" dirty="0" smtClean="0"/>
+              <a:t>0 and 1 </a:t>
+            </a:r>
+            <a:r>
+              <a:rPr lang="fr-FR" dirty="0" err="1" smtClean="0"/>
+              <a:t>columns</a:t>
+            </a:r>
+            <a:r>
+              <a:rPr lang="fr-FR" dirty="0" smtClean="0"/>
+              <a:t> are x and y </a:t>
+            </a:r>
+            <a:r>
+              <a:rPr lang="fr-FR" dirty="0" err="1" smtClean="0"/>
+              <a:t>coordinates</a:t>
+            </a:r>
+            <a:r>
+              <a:rPr lang="fr-FR" dirty="0" smtClean="0"/>
+              <a:t> in µm</a:t>
+            </a:r>
+          </a:p>
+          <a:p>
+            <a:pPr marL="285750" indent="-285750">
+              <a:buFont typeface="Arial" panose="020B0604020202020204" pitchFamily="34" charset="0"/>
+              <a:buChar char="•"/>
+            </a:pPr>
+            <a:endParaRPr lang="fr-FR" dirty="0"/>
+          </a:p>
+        </p:txBody>
+      </p:sp>
+      <p:sp>
+        <p:nvSpPr>
+          <p:cNvPr id="7" name="ZoneTexte 6"/>
+          <p:cNvSpPr txBox="1"/>
+          <p:nvPr/>
+        </p:nvSpPr>
+        <p:spPr>
+          <a:xfrm>
+            <a:off x="6732240" y="3505076"/>
+            <a:ext cx="2268252" cy="2308324"/>
+          </a:xfrm>
+          <a:prstGeom prst="rect">
+            <a:avLst/>
+          </a:prstGeom>
+          <a:noFill/>
+          <a:ln>
+            <a:solidFill>
+              <a:schemeClr val="tx1"/>
+            </a:solidFill>
+          </a:ln>
+        </p:spPr>
+        <p:txBody>
+          <a:bodyPr wrap="square" rtlCol="0">
+            <a:spAutoFit/>
+          </a:bodyPr>
+          <a:lstStyle/>
+          <a:p>
+            <a:r>
+              <a:rPr lang="fr-FR" dirty="0" smtClean="0"/>
+              <a:t>500 501 501…</a:t>
+            </a:r>
+          </a:p>
+          <a:p>
+            <a:r>
+              <a:rPr lang="fr-FR" dirty="0" smtClean="0"/>
+              <a:t>x1 y1 cts </a:t>
+            </a:r>
+            <a:r>
+              <a:rPr lang="fr-FR" dirty="0" err="1" smtClean="0"/>
+              <a:t>cts</a:t>
+            </a:r>
+            <a:r>
+              <a:rPr lang="fr-FR" dirty="0" smtClean="0"/>
+              <a:t> </a:t>
+            </a:r>
+            <a:r>
+              <a:rPr lang="fr-FR" dirty="0" err="1" smtClean="0"/>
+              <a:t>cts</a:t>
+            </a:r>
+            <a:r>
+              <a:rPr lang="fr-FR" dirty="0" smtClean="0"/>
+              <a:t> </a:t>
+            </a:r>
+          </a:p>
+          <a:p>
+            <a:r>
+              <a:rPr lang="fr-FR" dirty="0" smtClean="0"/>
+              <a:t>x1 y2 cts </a:t>
+            </a:r>
+            <a:r>
+              <a:rPr lang="fr-FR" dirty="0" err="1" smtClean="0"/>
+              <a:t>cts</a:t>
+            </a:r>
+            <a:r>
+              <a:rPr lang="fr-FR" dirty="0" smtClean="0"/>
+              <a:t>…</a:t>
+            </a:r>
+          </a:p>
+          <a:p>
+            <a:r>
+              <a:rPr lang="fr-FR" dirty="0" smtClean="0"/>
+              <a:t>…</a:t>
+            </a:r>
+          </a:p>
+          <a:p>
+            <a:r>
+              <a:rPr lang="fr-FR" dirty="0" smtClean="0"/>
+              <a:t>x1 </a:t>
+            </a:r>
+            <a:r>
+              <a:rPr lang="fr-FR" dirty="0" err="1" smtClean="0"/>
+              <a:t>yN</a:t>
+            </a:r>
+            <a:r>
+              <a:rPr lang="fr-FR" dirty="0" smtClean="0"/>
+              <a:t> cts </a:t>
+            </a:r>
+            <a:r>
+              <a:rPr lang="fr-FR" dirty="0" err="1" smtClean="0"/>
+              <a:t>cts</a:t>
+            </a:r>
+            <a:r>
+              <a:rPr lang="fr-FR" dirty="0" smtClean="0"/>
+              <a:t>…</a:t>
+            </a:r>
+          </a:p>
+          <a:p>
+            <a:r>
+              <a:rPr lang="fr-FR" dirty="0" smtClean="0"/>
+              <a:t>x2 y1 cts </a:t>
+            </a:r>
+            <a:r>
+              <a:rPr lang="fr-FR" dirty="0" err="1" smtClean="0"/>
+              <a:t>cts</a:t>
+            </a:r>
+            <a:r>
+              <a:rPr lang="fr-FR" dirty="0" smtClean="0"/>
+              <a:t> </a:t>
+            </a:r>
+            <a:r>
+              <a:rPr lang="fr-FR" dirty="0" err="1" smtClean="0"/>
+              <a:t>cts</a:t>
+            </a:r>
+            <a:r>
+              <a:rPr lang="fr-FR" dirty="0" smtClean="0"/>
+              <a:t> …</a:t>
+            </a:r>
+          </a:p>
+          <a:p>
+            <a:r>
+              <a:rPr lang="fr-FR" dirty="0" smtClean="0"/>
+              <a:t>…..</a:t>
+            </a:r>
+          </a:p>
+          <a:p>
+            <a:r>
+              <a:rPr lang="fr-FR" dirty="0" err="1" smtClean="0"/>
+              <a:t>xN</a:t>
+            </a:r>
+            <a:r>
+              <a:rPr lang="fr-FR" dirty="0" smtClean="0"/>
+              <a:t> </a:t>
+            </a:r>
+            <a:r>
+              <a:rPr lang="fr-FR" dirty="0" err="1" smtClean="0"/>
+              <a:t>yN</a:t>
+            </a:r>
+            <a:r>
+              <a:rPr lang="fr-FR" dirty="0" smtClean="0"/>
+              <a:t> cts </a:t>
+            </a:r>
+            <a:r>
+              <a:rPr lang="fr-FR" dirty="0" err="1" smtClean="0"/>
+              <a:t>cts</a:t>
+            </a:r>
+            <a:r>
+              <a:rPr lang="fr-FR" dirty="0" smtClean="0"/>
+              <a:t> </a:t>
+            </a:r>
+            <a:r>
+              <a:rPr lang="fr-FR" dirty="0" err="1" smtClean="0"/>
+              <a:t>cts</a:t>
+            </a:r>
+            <a:r>
+              <a:rPr lang="fr-FR" dirty="0" smtClean="0"/>
+              <a:t> …</a:t>
+            </a:r>
+          </a:p>
+        </p:txBody>
+      </p:sp>
+    </p:spTree>
+    <p:extLst>
+      <p:ext uri="{BB962C8B-B14F-4D97-AF65-F5344CB8AC3E}">
+        <p14:creationId xmlns:p14="http://schemas.microsoft.com/office/powerpoint/2010/main" val="3237982936"/>
+      </p:ext>
+    </p:extLst>
+  </p:cSld>
+  <p:clrMapOvr>
+    <a:masterClrMapping/>
+  </p:clrMapOvr>
+</p:sld>
+</file>
+
+<file path=ppt/slides/slide4.xml><?xml version="1.0" encoding="utf-8"?>
+<p:sld xmlns:a="http://schemas.openxmlformats.org/drawingml/2006/main" xmlns:r="http://schemas.openxmlformats.org/officeDocument/2006/relationships" xmlns:p="http://schemas.openxmlformats.org/presentationml/2006/main">
+  <p:cSld>
+    <p:spTree>
+      <p:nvGrpSpPr>
+        <p:cNvPr id="1" name=""/>
+        <p:cNvGrpSpPr/>
+        <p:nvPr/>
+      </p:nvGrpSpPr>
+      <p:grpSpPr>
+        <a:xfrm>
+          <a:off x="0" y="0"/>
+          <a:ext cx="0" cy="0"/>
+          <a:chOff x="0" y="0"/>
+          <a:chExt cx="0" cy="0"/>
+        </a:xfrm>
+      </p:grpSpPr>
+      <p:sp>
+        <p:nvSpPr>
+          <p:cNvPr id="2" name="Espace réservé du pied de page 1"/>
+          <p:cNvSpPr>
+            <a:spLocks noGrp="1"/>
+          </p:cNvSpPr>
+          <p:nvPr>
+            <p:ph type="ftr" sz="quarter" idx="3"/>
+          </p:nvPr>
+        </p:nvSpPr>
+        <p:spPr/>
+        <p:txBody>
+          <a:bodyPr/>
+          <a:lstStyle/>
+          <a:p>
+            <a:r>
+              <a:rPr lang="fr-FR" smtClean="0"/>
+              <a:t>CR | Michaud Laurent | Date</a:t>
+            </a:r>
+            <a:endParaRPr lang="fr-FR" dirty="0"/>
+          </a:p>
+        </p:txBody>
+      </p:sp>
+      <p:sp>
+        <p:nvSpPr>
+          <p:cNvPr id="3" name="Espace réservé du contenu 2"/>
+          <p:cNvSpPr>
+            <a:spLocks noGrp="1"/>
+          </p:cNvSpPr>
+          <p:nvPr>
+            <p:ph sz="quarter" idx="18"/>
+          </p:nvPr>
+        </p:nvSpPr>
+        <p:spPr/>
+        <p:txBody>
+          <a:bodyPr/>
+          <a:lstStyle/>
+          <a:p>
+            <a:r>
+              <a:rPr lang="fr-FR" dirty="0" smtClean="0"/>
+              <a:t>Inputs : </a:t>
+            </a:r>
+          </a:p>
+          <a:p>
+            <a:pPr lvl="1"/>
+            <a:r>
+              <a:rPr lang="fr-FR" dirty="0" smtClean="0"/>
+              <a:t>TDMS file or bulge </a:t>
+            </a:r>
+            <a:r>
+              <a:rPr lang="fr-FR" dirty="0" err="1" smtClean="0"/>
+              <a:t>height</a:t>
+            </a:r>
+            <a:r>
+              <a:rPr lang="fr-FR" dirty="0" smtClean="0"/>
+              <a:t> and radius in case of bulge test</a:t>
+            </a:r>
+          </a:p>
+          <a:p>
+            <a:pPr lvl="1"/>
+            <a:r>
+              <a:rPr lang="fr-FR" dirty="0" smtClean="0"/>
+              <a:t>Raman files (</a:t>
+            </a:r>
+            <a:r>
+              <a:rPr lang="fr-FR" dirty="0" err="1" smtClean="0"/>
+              <a:t>prefix</a:t>
+            </a:r>
+            <a:r>
+              <a:rPr lang="fr-FR" dirty="0" smtClean="0"/>
+              <a:t>, range and </a:t>
+            </a:r>
+            <a:r>
+              <a:rPr lang="fr-FR" dirty="0" err="1" smtClean="0"/>
+              <a:t>folder</a:t>
+            </a:r>
+            <a:r>
+              <a:rPr lang="fr-FR" dirty="0" smtClean="0"/>
+              <a:t>)</a:t>
+            </a:r>
+          </a:p>
+          <a:p>
+            <a:pPr lvl="1"/>
+            <a:r>
+              <a:rPr lang="fr-FR" dirty="0" err="1" smtClean="0"/>
+              <a:t>Sample</a:t>
+            </a:r>
+            <a:r>
+              <a:rPr lang="fr-FR" dirty="0" smtClean="0"/>
+              <a:t> dimension (for stress)</a:t>
+            </a:r>
+          </a:p>
+          <a:p>
+            <a:pPr lvl="1"/>
+            <a:r>
+              <a:rPr lang="fr-FR" dirty="0" smtClean="0"/>
+              <a:t>Orientation [110] [100] </a:t>
+            </a:r>
+          </a:p>
+          <a:p>
+            <a:pPr lvl="1"/>
+            <a:r>
+              <a:rPr lang="fr-FR" dirty="0" err="1" smtClean="0"/>
+              <a:t>Tensile</a:t>
+            </a:r>
+            <a:r>
+              <a:rPr lang="fr-FR" dirty="0" smtClean="0"/>
+              <a:t> configuration (</a:t>
+            </a:r>
+            <a:r>
+              <a:rPr lang="fr-FR" dirty="0" err="1" smtClean="0"/>
+              <a:t>uniaxial</a:t>
+            </a:r>
+            <a:r>
+              <a:rPr lang="fr-FR" dirty="0" smtClean="0"/>
+              <a:t>, </a:t>
+            </a:r>
+            <a:r>
+              <a:rPr lang="fr-FR" dirty="0" err="1" smtClean="0"/>
+              <a:t>biaxial</a:t>
+            </a:r>
+            <a:r>
+              <a:rPr lang="fr-FR" dirty="0" smtClean="0"/>
+              <a:t>)</a:t>
+            </a:r>
+          </a:p>
+          <a:p>
+            <a:r>
+              <a:rPr lang="fr-FR" dirty="0" smtClean="0"/>
+              <a:t>Outputs</a:t>
+            </a:r>
+          </a:p>
+          <a:p>
+            <a:pPr lvl="1"/>
+            <a:r>
+              <a:rPr lang="fr-FR" dirty="0" smtClean="0"/>
+              <a:t>Plot (</a:t>
+            </a:r>
+            <a:r>
+              <a:rPr lang="fr-FR" dirty="0" err="1" smtClean="0"/>
+              <a:t>eps</a:t>
+            </a:r>
+            <a:r>
+              <a:rPr lang="fr-FR" dirty="0" smtClean="0"/>
+              <a:t>\</a:t>
+            </a:r>
+            <a:r>
+              <a:rPr lang="fr-FR" dirty="0" err="1" smtClean="0"/>
+              <a:t>png</a:t>
+            </a:r>
+            <a:r>
+              <a:rPr lang="fr-FR" dirty="0" smtClean="0"/>
+              <a:t>) </a:t>
+            </a:r>
+            <a:r>
+              <a:rPr lang="fr-FR" dirty="0" err="1" smtClean="0"/>
+              <a:t>strain_si</a:t>
+            </a:r>
+            <a:r>
+              <a:rPr lang="fr-FR" dirty="0" smtClean="0"/>
+              <a:t> = f(</a:t>
+            </a:r>
+            <a:r>
+              <a:rPr lang="fr-FR" dirty="0" err="1" smtClean="0"/>
+              <a:t>strain_macro</a:t>
+            </a:r>
+            <a:r>
+              <a:rPr lang="fr-FR" dirty="0" smtClean="0"/>
+              <a:t>)</a:t>
+            </a:r>
+          </a:p>
+          <a:p>
+            <a:pPr lvl="1"/>
+            <a:r>
+              <a:rPr lang="fr-FR" dirty="0" smtClean="0"/>
+              <a:t>.</a:t>
+            </a:r>
+            <a:r>
+              <a:rPr lang="fr-FR" dirty="0" err="1" smtClean="0"/>
+              <a:t>txt</a:t>
+            </a:r>
+            <a:r>
+              <a:rPr lang="fr-FR" dirty="0" smtClean="0"/>
+              <a:t> </a:t>
+            </a:r>
+            <a:r>
+              <a:rPr lang="fr-FR" dirty="0" err="1" smtClean="0"/>
+              <a:t>results</a:t>
+            </a:r>
+            <a:endParaRPr lang="fr-FR" dirty="0" smtClean="0"/>
+          </a:p>
+          <a:p>
+            <a:pPr marL="441325" lvl="1" indent="0">
+              <a:buNone/>
+            </a:pPr>
+            <a:endParaRPr lang="fr-FR" dirty="0"/>
+          </a:p>
+          <a:p>
+            <a:pPr lvl="1"/>
+            <a:endParaRPr lang="fr-FR" dirty="0" smtClean="0"/>
+          </a:p>
+        </p:txBody>
+      </p:sp>
+      <p:sp>
+        <p:nvSpPr>
+          <p:cNvPr id="4" name="Titre 3"/>
+          <p:cNvSpPr>
+            <a:spLocks noGrp="1"/>
+          </p:cNvSpPr>
+          <p:nvPr>
+            <p:ph type="title"/>
+          </p:nvPr>
+        </p:nvSpPr>
+        <p:spPr/>
+        <p:txBody>
+          <a:bodyPr/>
+          <a:lstStyle/>
+          <a:p>
+            <a:r>
+              <a:rPr lang="fr-FR" dirty="0" err="1" smtClean="0"/>
+              <a:t>Tensile</a:t>
+            </a:r>
+            <a:r>
+              <a:rPr lang="fr-FR" dirty="0" smtClean="0"/>
+              <a:t> </a:t>
+            </a:r>
+            <a:r>
+              <a:rPr lang="fr-FR" dirty="0" err="1" smtClean="0"/>
+              <a:t>curve</a:t>
+            </a:r>
+            <a:r>
+              <a:rPr lang="fr-FR" dirty="0" smtClean="0"/>
+              <a:t> plot </a:t>
+            </a:r>
+            <a:r>
+              <a:rPr lang="fr-FR" dirty="0" err="1" smtClean="0"/>
+              <a:t>tool</a:t>
+            </a:r>
+            <a:endParaRPr lang="fr-FR" dirty="0"/>
+          </a:p>
+        </p:txBody>
+      </p:sp>
+      <p:sp>
+        <p:nvSpPr>
+          <p:cNvPr id="5" name="Accolade fermante 4"/>
+          <p:cNvSpPr/>
+          <p:nvPr/>
+        </p:nvSpPr>
+        <p:spPr>
+          <a:xfrm>
+            <a:off x="4899609" y="2420888"/>
+            <a:ext cx="443480" cy="648072"/>
+          </a:xfrm>
+          <a:prstGeom prst="rightBrace">
+            <a:avLst/>
+          </a:prstGeom>
+          <a:ln w="38100">
+            <a:solidFill>
+              <a:schemeClr val="tx1"/>
+            </a:solidFill>
+          </a:ln>
+        </p:spPr>
+        <p:style>
+          <a:lnRef idx="1">
+            <a:schemeClr val="accent1"/>
+          </a:lnRef>
+          <a:fillRef idx="0">
+            <a:schemeClr val="accent1"/>
+          </a:fillRef>
+          <a:effectRef idx="0">
+            <a:schemeClr val="accent1"/>
+          </a:effectRef>
+          <a:fontRef idx="minor">
+            <a:schemeClr val="tx1"/>
+          </a:fontRef>
+        </p:style>
+        <p:txBody>
+          <a:bodyPr rtlCol="0" anchor="ctr"/>
+          <a:lstStyle/>
+          <a:p>
+            <a:pPr algn="ctr"/>
+            <a:endParaRPr lang="fr-FR"/>
+          </a:p>
+        </p:txBody>
+      </p:sp>
+      <p:sp>
+        <p:nvSpPr>
+          <p:cNvPr id="6" name="ZoneTexte 5"/>
+          <p:cNvSpPr txBox="1"/>
+          <p:nvPr/>
+        </p:nvSpPr>
+        <p:spPr>
+          <a:xfrm>
+            <a:off x="5343089" y="2560258"/>
+            <a:ext cx="3816425" cy="369332"/>
+          </a:xfrm>
+          <a:prstGeom prst="rect">
+            <a:avLst/>
+          </a:prstGeom>
+          <a:noFill/>
+        </p:spPr>
+        <p:txBody>
+          <a:bodyPr wrap="square" rtlCol="0">
+            <a:spAutoFit/>
+          </a:bodyPr>
+          <a:lstStyle/>
+          <a:p>
+            <a:r>
+              <a:rPr lang="fr-FR" dirty="0" smtClean="0"/>
+              <a:t>To use </a:t>
+            </a:r>
+            <a:r>
+              <a:rPr lang="fr-FR" smtClean="0"/>
+              <a:t>corresponding</a:t>
+            </a:r>
+            <a:r>
+              <a:rPr lang="fr-FR" dirty="0" smtClean="0"/>
+              <a:t> coefficient</a:t>
+            </a:r>
+            <a:endParaRPr lang="fr-FR" dirty="0"/>
+          </a:p>
+        </p:txBody>
+      </p:sp>
+    </p:spTree>
+    <p:extLst>
+      <p:ext uri="{BB962C8B-B14F-4D97-AF65-F5344CB8AC3E}">
+        <p14:creationId xmlns:p14="http://schemas.microsoft.com/office/powerpoint/2010/main" val="1660697865"/>
       </p:ext>
     </p:extLst>
   </p:cSld>

</xml_diff>